<commit_message>
Update Fraud Analytics Dashboard.pptx
</commit_message>
<xml_diff>
--- a/Fraud Analytics Dashboard.pptx
+++ b/Fraud Analytics Dashboard.pptx
@@ -3676,10 +3676,10 @@
       </p:grpSpPr>
       <p:pic>
         <p:nvPicPr>
-          <p:cNvPr id="6" name="Picture 5">
-            <a:extLst>
-              <a:ext uri="{FF2B5EF4-FFF2-40B4-BE49-F238E27FC236}">
-                <a16:creationId xmlns:a16="http://schemas.microsoft.com/office/drawing/2014/main" id="{470CF664-3F6B-816A-7875-33F9E3B20555}"/>
+          <p:cNvPr id="3" name="Picture 2">
+            <a:extLst>
+              <a:ext uri="{FF2B5EF4-FFF2-40B4-BE49-F238E27FC236}">
+                <a16:creationId xmlns:a16="http://schemas.microsoft.com/office/drawing/2014/main" id="{E797BAD5-AAE7-9D4E-9670-880DDC445EC1}"/>
               </a:ext>
             </a:extLst>
           </p:cNvPr>
@@ -3696,8 +3696,8 @@
         </p:blipFill>
         <p:spPr>
           <a:xfrm>
-            <a:off x="704088" y="486421"/>
-            <a:ext cx="10753344" cy="5916559"/>
+            <a:off x="960120" y="658127"/>
+            <a:ext cx="10533888" cy="5815122"/>
           </a:xfrm>
           <a:prstGeom prst="rect">
             <a:avLst/>
@@ -3814,10 +3814,10 @@
       </p:sp>
       <p:pic>
         <p:nvPicPr>
-          <p:cNvPr id="5" name="Picture 4">
-            <a:extLst>
-              <a:ext uri="{FF2B5EF4-FFF2-40B4-BE49-F238E27FC236}">
-                <a16:creationId xmlns:a16="http://schemas.microsoft.com/office/drawing/2014/main" id="{CD30F3A4-1661-F4A0-B3F3-9862101A4E23}"/>
+          <p:cNvPr id="7" name="Picture 6">
+            <a:extLst>
+              <a:ext uri="{FF2B5EF4-FFF2-40B4-BE49-F238E27FC236}">
+                <a16:creationId xmlns:a16="http://schemas.microsoft.com/office/drawing/2014/main" id="{61891D67-75E6-C856-3AFD-1D4E1CED6F26}"/>
               </a:ext>
             </a:extLst>
           </p:cNvPr>
@@ -3834,8 +3834,8 @@
         </p:blipFill>
         <p:spPr>
           <a:xfrm>
-            <a:off x="838200" y="3022535"/>
-            <a:ext cx="4901915" cy="1957517"/>
+            <a:off x="6169153" y="3022535"/>
+            <a:ext cx="4273296" cy="3577643"/>
           </a:xfrm>
           <a:prstGeom prst="rect">
             <a:avLst/>
@@ -3844,10 +3844,10 @@
       </p:pic>
       <p:pic>
         <p:nvPicPr>
-          <p:cNvPr id="7" name="Picture 6">
-            <a:extLst>
-              <a:ext uri="{FF2B5EF4-FFF2-40B4-BE49-F238E27FC236}">
-                <a16:creationId xmlns:a16="http://schemas.microsoft.com/office/drawing/2014/main" id="{61891D67-75E6-C856-3AFD-1D4E1CED6F26}"/>
+          <p:cNvPr id="6" name="Picture 5">
+            <a:extLst>
+              <a:ext uri="{FF2B5EF4-FFF2-40B4-BE49-F238E27FC236}">
+                <a16:creationId xmlns:a16="http://schemas.microsoft.com/office/drawing/2014/main" id="{B3B0EBD2-5315-D5D9-A0B0-0B9DA1397913}"/>
               </a:ext>
             </a:extLst>
           </p:cNvPr>
@@ -3864,8 +3864,8 @@
         </p:blipFill>
         <p:spPr>
           <a:xfrm>
-            <a:off x="6169153" y="3022535"/>
-            <a:ext cx="4273296" cy="3577643"/>
+            <a:off x="1068090" y="3022535"/>
+            <a:ext cx="4577934" cy="3274047"/>
           </a:xfrm>
           <a:prstGeom prst="rect">
             <a:avLst/>
@@ -3987,10 +3987,10 @@
       </p:sp>
       <p:pic>
         <p:nvPicPr>
-          <p:cNvPr id="6" name="Picture 5">
-            <a:extLst>
-              <a:ext uri="{FF2B5EF4-FFF2-40B4-BE49-F238E27FC236}">
-                <a16:creationId xmlns:a16="http://schemas.microsoft.com/office/drawing/2014/main" id="{AF29B540-1870-E6C5-C586-512524324F1C}"/>
+          <p:cNvPr id="5" name="Picture 4">
+            <a:extLst>
+              <a:ext uri="{FF2B5EF4-FFF2-40B4-BE49-F238E27FC236}">
+                <a16:creationId xmlns:a16="http://schemas.microsoft.com/office/drawing/2014/main" id="{41539136-AB03-502B-BB4C-D5238A9F937A}"/>
               </a:ext>
             </a:extLst>
           </p:cNvPr>
@@ -4007,8 +4007,8 @@
         </p:blipFill>
         <p:spPr>
           <a:xfrm>
-            <a:off x="1039368" y="2788919"/>
-            <a:ext cx="6449568" cy="3455449"/>
+            <a:off x="1078992" y="2862657"/>
+            <a:ext cx="6492240" cy="3544140"/>
           </a:xfrm>
           <a:prstGeom prst="rect">
             <a:avLst/>

</xml_diff>